<commit_message>
remove bus from image
</commit_message>
<xml_diff>
--- a/nservicebus/sagas/reply-replaytooriginator-differences-assets.pptx
+++ b/nservicebus/sagas/reply-replaytooriginator-differences-assets.pptx
@@ -154,7 +154,7 @@
           </a:lstStyle>
           <a:p>
             <a:r>
-              <a:rPr lang="en-US" smtClean="0"/>
+              <a:rPr lang="en-US"/>
               <a:t>Click to edit Master title style</a:t>
             </a:r>
             <a:endParaRPr lang="it-IT"/>
@@ -219,7 +219,7 @@
           </a:lstStyle>
           <a:p>
             <a:r>
-              <a:rPr lang="en-US" smtClean="0"/>
+              <a:rPr lang="en-US"/>
               <a:t>Click to edit Master subtitle style</a:t>
             </a:r>
             <a:endParaRPr lang="it-IT"/>
@@ -243,7 +243,7 @@
           <a:p>
             <a:fld id="{9934895A-A1F1-4E43-995C-836991ADE3CE}" type="datetimeFigureOut">
               <a:rPr lang="it-IT" smtClean="0"/>
-              <a:t>05/06/2015</a:t>
+              <a:t>23/08/2016</a:t>
             </a:fld>
             <a:endParaRPr lang="it-IT" dirty="0"/>
           </a:p>
@@ -337,7 +337,7 @@
           <a:lstStyle/>
           <a:p>
             <a:r>
-              <a:rPr lang="en-US" smtClean="0"/>
+              <a:rPr lang="en-US"/>
               <a:t>Click to edit Master title style</a:t>
             </a:r>
             <a:endParaRPr lang="it-IT"/>
@@ -361,35 +361,35 @@
           <a:p>
             <a:pPr lvl="0"/>
             <a:r>
-              <a:rPr lang="en-US" smtClean="0"/>
+              <a:rPr lang="en-US"/>
               <a:t>Click to edit Master text styles</a:t>
             </a:r>
           </a:p>
           <a:p>
             <a:pPr lvl="1"/>
             <a:r>
-              <a:rPr lang="en-US" smtClean="0"/>
+              <a:rPr lang="en-US"/>
               <a:t>Second level</a:t>
             </a:r>
           </a:p>
           <a:p>
             <a:pPr lvl="2"/>
             <a:r>
-              <a:rPr lang="en-US" smtClean="0"/>
+              <a:rPr lang="en-US"/>
               <a:t>Third level</a:t>
             </a:r>
           </a:p>
           <a:p>
             <a:pPr lvl="3"/>
             <a:r>
-              <a:rPr lang="en-US" smtClean="0"/>
+              <a:rPr lang="en-US"/>
               <a:t>Fourth level</a:t>
             </a:r>
           </a:p>
           <a:p>
             <a:pPr lvl="4"/>
             <a:r>
-              <a:rPr lang="en-US" smtClean="0"/>
+              <a:rPr lang="en-US"/>
               <a:t>Fifth level</a:t>
             </a:r>
             <a:endParaRPr lang="it-IT"/>
@@ -413,7 +413,7 @@
           <a:p>
             <a:fld id="{9934895A-A1F1-4E43-995C-836991ADE3CE}" type="datetimeFigureOut">
               <a:rPr lang="it-IT" smtClean="0"/>
-              <a:t>05/06/2015</a:t>
+              <a:t>23/08/2016</a:t>
             </a:fld>
             <a:endParaRPr lang="it-IT" dirty="0"/>
           </a:p>
@@ -512,7 +512,7 @@
           <a:lstStyle/>
           <a:p>
             <a:r>
-              <a:rPr lang="en-US" smtClean="0"/>
+              <a:rPr lang="en-US"/>
               <a:t>Click to edit Master title style</a:t>
             </a:r>
             <a:endParaRPr lang="it-IT"/>
@@ -541,35 +541,35 @@
           <a:p>
             <a:pPr lvl="0"/>
             <a:r>
-              <a:rPr lang="en-US" smtClean="0"/>
+              <a:rPr lang="en-US"/>
               <a:t>Click to edit Master text styles</a:t>
             </a:r>
           </a:p>
           <a:p>
             <a:pPr lvl="1"/>
             <a:r>
-              <a:rPr lang="en-US" smtClean="0"/>
+              <a:rPr lang="en-US"/>
               <a:t>Second level</a:t>
             </a:r>
           </a:p>
           <a:p>
             <a:pPr lvl="2"/>
             <a:r>
-              <a:rPr lang="en-US" smtClean="0"/>
+              <a:rPr lang="en-US"/>
               <a:t>Third level</a:t>
             </a:r>
           </a:p>
           <a:p>
             <a:pPr lvl="3"/>
             <a:r>
-              <a:rPr lang="en-US" smtClean="0"/>
+              <a:rPr lang="en-US"/>
               <a:t>Fourth level</a:t>
             </a:r>
           </a:p>
           <a:p>
             <a:pPr lvl="4"/>
             <a:r>
-              <a:rPr lang="en-US" smtClean="0"/>
+              <a:rPr lang="en-US"/>
               <a:t>Fifth level</a:t>
             </a:r>
             <a:endParaRPr lang="it-IT"/>
@@ -593,7 +593,7 @@
           <a:p>
             <a:fld id="{9934895A-A1F1-4E43-995C-836991ADE3CE}" type="datetimeFigureOut">
               <a:rPr lang="it-IT" smtClean="0"/>
-              <a:t>05/06/2015</a:t>
+              <a:t>23/08/2016</a:t>
             </a:fld>
             <a:endParaRPr lang="it-IT" dirty="0"/>
           </a:p>
@@ -687,7 +687,7 @@
           <a:lstStyle/>
           <a:p>
             <a:r>
-              <a:rPr lang="en-US" smtClean="0"/>
+              <a:rPr lang="en-US"/>
               <a:t>Click to edit Master title style</a:t>
             </a:r>
             <a:endParaRPr lang="it-IT"/>
@@ -711,35 +711,35 @@
           <a:p>
             <a:pPr lvl="0"/>
             <a:r>
-              <a:rPr lang="en-US" smtClean="0"/>
+              <a:rPr lang="en-US"/>
               <a:t>Click to edit Master text styles</a:t>
             </a:r>
           </a:p>
           <a:p>
             <a:pPr lvl="1"/>
             <a:r>
-              <a:rPr lang="en-US" smtClean="0"/>
+              <a:rPr lang="en-US"/>
               <a:t>Second level</a:t>
             </a:r>
           </a:p>
           <a:p>
             <a:pPr lvl="2"/>
             <a:r>
-              <a:rPr lang="en-US" smtClean="0"/>
+              <a:rPr lang="en-US"/>
               <a:t>Third level</a:t>
             </a:r>
           </a:p>
           <a:p>
             <a:pPr lvl="3"/>
             <a:r>
-              <a:rPr lang="en-US" smtClean="0"/>
+              <a:rPr lang="en-US"/>
               <a:t>Fourth level</a:t>
             </a:r>
           </a:p>
           <a:p>
             <a:pPr lvl="4"/>
             <a:r>
-              <a:rPr lang="en-US" smtClean="0"/>
+              <a:rPr lang="en-US"/>
               <a:t>Fifth level</a:t>
             </a:r>
             <a:endParaRPr lang="it-IT"/>
@@ -763,7 +763,7 @@
           <a:p>
             <a:fld id="{9934895A-A1F1-4E43-995C-836991ADE3CE}" type="datetimeFigureOut">
               <a:rPr lang="it-IT" smtClean="0"/>
-              <a:t>05/06/2015</a:t>
+              <a:t>23/08/2016</a:t>
             </a:fld>
             <a:endParaRPr lang="it-IT" dirty="0"/>
           </a:p>
@@ -866,7 +866,7 @@
           </a:lstStyle>
           <a:p>
             <a:r>
-              <a:rPr lang="en-US" smtClean="0"/>
+              <a:rPr lang="en-US"/>
               <a:t>Click to edit Master title style</a:t>
             </a:r>
             <a:endParaRPr lang="it-IT"/>
@@ -986,7 +986,7 @@
           <a:p>
             <a:pPr lvl="0"/>
             <a:r>
-              <a:rPr lang="en-US" smtClean="0"/>
+              <a:rPr lang="en-US"/>
               <a:t>Click to edit Master text styles</a:t>
             </a:r>
           </a:p>
@@ -1009,7 +1009,7 @@
           <a:p>
             <a:fld id="{9934895A-A1F1-4E43-995C-836991ADE3CE}" type="datetimeFigureOut">
               <a:rPr lang="it-IT" smtClean="0"/>
-              <a:t>05/06/2015</a:t>
+              <a:t>23/08/2016</a:t>
             </a:fld>
             <a:endParaRPr lang="it-IT" dirty="0"/>
           </a:p>
@@ -1103,7 +1103,7 @@
           <a:lstStyle/>
           <a:p>
             <a:r>
-              <a:rPr lang="en-US" smtClean="0"/>
+              <a:rPr lang="en-US"/>
               <a:t>Click to edit Master title style</a:t>
             </a:r>
             <a:endParaRPr lang="it-IT"/>
@@ -1132,35 +1132,35 @@
           <a:p>
             <a:pPr lvl="0"/>
             <a:r>
-              <a:rPr lang="en-US" smtClean="0"/>
+              <a:rPr lang="en-US"/>
               <a:t>Click to edit Master text styles</a:t>
             </a:r>
           </a:p>
           <a:p>
             <a:pPr lvl="1"/>
             <a:r>
-              <a:rPr lang="en-US" smtClean="0"/>
+              <a:rPr lang="en-US"/>
               <a:t>Second level</a:t>
             </a:r>
           </a:p>
           <a:p>
             <a:pPr lvl="2"/>
             <a:r>
-              <a:rPr lang="en-US" smtClean="0"/>
+              <a:rPr lang="en-US"/>
               <a:t>Third level</a:t>
             </a:r>
           </a:p>
           <a:p>
             <a:pPr lvl="3"/>
             <a:r>
-              <a:rPr lang="en-US" smtClean="0"/>
+              <a:rPr lang="en-US"/>
               <a:t>Fourth level</a:t>
             </a:r>
           </a:p>
           <a:p>
             <a:pPr lvl="4"/>
             <a:r>
-              <a:rPr lang="en-US" smtClean="0"/>
+              <a:rPr lang="en-US"/>
               <a:t>Fifth level</a:t>
             </a:r>
             <a:endParaRPr lang="it-IT"/>
@@ -1189,35 +1189,35 @@
           <a:p>
             <a:pPr lvl="0"/>
             <a:r>
-              <a:rPr lang="en-US" smtClean="0"/>
+              <a:rPr lang="en-US"/>
               <a:t>Click to edit Master text styles</a:t>
             </a:r>
           </a:p>
           <a:p>
             <a:pPr lvl="1"/>
             <a:r>
-              <a:rPr lang="en-US" smtClean="0"/>
+              <a:rPr lang="en-US"/>
               <a:t>Second level</a:t>
             </a:r>
           </a:p>
           <a:p>
             <a:pPr lvl="2"/>
             <a:r>
-              <a:rPr lang="en-US" smtClean="0"/>
+              <a:rPr lang="en-US"/>
               <a:t>Third level</a:t>
             </a:r>
           </a:p>
           <a:p>
             <a:pPr lvl="3"/>
             <a:r>
-              <a:rPr lang="en-US" smtClean="0"/>
+              <a:rPr lang="en-US"/>
               <a:t>Fourth level</a:t>
             </a:r>
           </a:p>
           <a:p>
             <a:pPr lvl="4"/>
             <a:r>
-              <a:rPr lang="en-US" smtClean="0"/>
+              <a:rPr lang="en-US"/>
               <a:t>Fifth level</a:t>
             </a:r>
             <a:endParaRPr lang="it-IT"/>
@@ -1241,7 +1241,7 @@
           <a:p>
             <a:fld id="{9934895A-A1F1-4E43-995C-836991ADE3CE}" type="datetimeFigureOut">
               <a:rPr lang="it-IT" smtClean="0"/>
-              <a:t>05/06/2015</a:t>
+              <a:t>23/08/2016</a:t>
             </a:fld>
             <a:endParaRPr lang="it-IT" dirty="0"/>
           </a:p>
@@ -1340,7 +1340,7 @@
           <a:lstStyle/>
           <a:p>
             <a:r>
-              <a:rPr lang="en-US" smtClean="0"/>
+              <a:rPr lang="en-US"/>
               <a:t>Click to edit Master title style</a:t>
             </a:r>
             <a:endParaRPr lang="it-IT"/>
@@ -1406,7 +1406,7 @@
           <a:p>
             <a:pPr lvl="0"/>
             <a:r>
-              <a:rPr lang="en-US" smtClean="0"/>
+              <a:rPr lang="en-US"/>
               <a:t>Click to edit Master text styles</a:t>
             </a:r>
           </a:p>
@@ -1434,35 +1434,35 @@
           <a:p>
             <a:pPr lvl="0"/>
             <a:r>
-              <a:rPr lang="en-US" smtClean="0"/>
+              <a:rPr lang="en-US"/>
               <a:t>Click to edit Master text styles</a:t>
             </a:r>
           </a:p>
           <a:p>
             <a:pPr lvl="1"/>
             <a:r>
-              <a:rPr lang="en-US" smtClean="0"/>
+              <a:rPr lang="en-US"/>
               <a:t>Second level</a:t>
             </a:r>
           </a:p>
           <a:p>
             <a:pPr lvl="2"/>
             <a:r>
-              <a:rPr lang="en-US" smtClean="0"/>
+              <a:rPr lang="en-US"/>
               <a:t>Third level</a:t>
             </a:r>
           </a:p>
           <a:p>
             <a:pPr lvl="3"/>
             <a:r>
-              <a:rPr lang="en-US" smtClean="0"/>
+              <a:rPr lang="en-US"/>
               <a:t>Fourth level</a:t>
             </a:r>
           </a:p>
           <a:p>
             <a:pPr lvl="4"/>
             <a:r>
-              <a:rPr lang="en-US" smtClean="0"/>
+              <a:rPr lang="en-US"/>
               <a:t>Fifth level</a:t>
             </a:r>
             <a:endParaRPr lang="it-IT"/>
@@ -1528,7 +1528,7 @@
           <a:p>
             <a:pPr lvl="0"/>
             <a:r>
-              <a:rPr lang="en-US" smtClean="0"/>
+              <a:rPr lang="en-US"/>
               <a:t>Click to edit Master text styles</a:t>
             </a:r>
           </a:p>
@@ -1556,35 +1556,35 @@
           <a:p>
             <a:pPr lvl="0"/>
             <a:r>
-              <a:rPr lang="en-US" smtClean="0"/>
+              <a:rPr lang="en-US"/>
               <a:t>Click to edit Master text styles</a:t>
             </a:r>
           </a:p>
           <a:p>
             <a:pPr lvl="1"/>
             <a:r>
-              <a:rPr lang="en-US" smtClean="0"/>
+              <a:rPr lang="en-US"/>
               <a:t>Second level</a:t>
             </a:r>
           </a:p>
           <a:p>
             <a:pPr lvl="2"/>
             <a:r>
-              <a:rPr lang="en-US" smtClean="0"/>
+              <a:rPr lang="en-US"/>
               <a:t>Third level</a:t>
             </a:r>
           </a:p>
           <a:p>
             <a:pPr lvl="3"/>
             <a:r>
-              <a:rPr lang="en-US" smtClean="0"/>
+              <a:rPr lang="en-US"/>
               <a:t>Fourth level</a:t>
             </a:r>
           </a:p>
           <a:p>
             <a:pPr lvl="4"/>
             <a:r>
-              <a:rPr lang="en-US" smtClean="0"/>
+              <a:rPr lang="en-US"/>
               <a:t>Fifth level</a:t>
             </a:r>
             <a:endParaRPr lang="it-IT"/>
@@ -1608,7 +1608,7 @@
           <a:p>
             <a:fld id="{9934895A-A1F1-4E43-995C-836991ADE3CE}" type="datetimeFigureOut">
               <a:rPr lang="it-IT" smtClean="0"/>
-              <a:t>05/06/2015</a:t>
+              <a:t>23/08/2016</a:t>
             </a:fld>
             <a:endParaRPr lang="it-IT" dirty="0"/>
           </a:p>
@@ -1702,7 +1702,7 @@
           <a:lstStyle/>
           <a:p>
             <a:r>
-              <a:rPr lang="en-US" smtClean="0"/>
+              <a:rPr lang="en-US"/>
               <a:t>Click to edit Master title style</a:t>
             </a:r>
             <a:endParaRPr lang="it-IT"/>
@@ -1726,7 +1726,7 @@
           <a:p>
             <a:fld id="{9934895A-A1F1-4E43-995C-836991ADE3CE}" type="datetimeFigureOut">
               <a:rPr lang="it-IT" smtClean="0"/>
-              <a:t>05/06/2015</a:t>
+              <a:t>23/08/2016</a:t>
             </a:fld>
             <a:endParaRPr lang="it-IT" dirty="0"/>
           </a:p>
@@ -1821,7 +1821,7 @@
           <a:p>
             <a:fld id="{9934895A-A1F1-4E43-995C-836991ADE3CE}" type="datetimeFigureOut">
               <a:rPr lang="it-IT" smtClean="0"/>
-              <a:t>05/06/2015</a:t>
+              <a:t>23/08/2016</a:t>
             </a:fld>
             <a:endParaRPr lang="it-IT" dirty="0"/>
           </a:p>
@@ -1924,7 +1924,7 @@
           </a:lstStyle>
           <a:p>
             <a:r>
-              <a:rPr lang="en-US" smtClean="0"/>
+              <a:rPr lang="en-US"/>
               <a:t>Click to edit Master title style</a:t>
             </a:r>
             <a:endParaRPr lang="it-IT"/>
@@ -1981,35 +1981,35 @@
           <a:p>
             <a:pPr lvl="0"/>
             <a:r>
-              <a:rPr lang="en-US" smtClean="0"/>
+              <a:rPr lang="en-US"/>
               <a:t>Click to edit Master text styles</a:t>
             </a:r>
           </a:p>
           <a:p>
             <a:pPr lvl="1"/>
             <a:r>
-              <a:rPr lang="en-US" smtClean="0"/>
+              <a:rPr lang="en-US"/>
               <a:t>Second level</a:t>
             </a:r>
           </a:p>
           <a:p>
             <a:pPr lvl="2"/>
             <a:r>
-              <a:rPr lang="en-US" smtClean="0"/>
+              <a:rPr lang="en-US"/>
               <a:t>Third level</a:t>
             </a:r>
           </a:p>
           <a:p>
             <a:pPr lvl="3"/>
             <a:r>
-              <a:rPr lang="en-US" smtClean="0"/>
+              <a:rPr lang="en-US"/>
               <a:t>Fourth level</a:t>
             </a:r>
           </a:p>
           <a:p>
             <a:pPr lvl="4"/>
             <a:r>
-              <a:rPr lang="en-US" smtClean="0"/>
+              <a:rPr lang="en-US"/>
               <a:t>Fifth level</a:t>
             </a:r>
             <a:endParaRPr lang="it-IT"/>
@@ -2075,7 +2075,7 @@
           <a:p>
             <a:pPr lvl="0"/>
             <a:r>
-              <a:rPr lang="en-US" smtClean="0"/>
+              <a:rPr lang="en-US"/>
               <a:t>Click to edit Master text styles</a:t>
             </a:r>
           </a:p>
@@ -2098,7 +2098,7 @@
           <a:p>
             <a:fld id="{9934895A-A1F1-4E43-995C-836991ADE3CE}" type="datetimeFigureOut">
               <a:rPr lang="it-IT" smtClean="0"/>
-              <a:t>05/06/2015</a:t>
+              <a:t>23/08/2016</a:t>
             </a:fld>
             <a:endParaRPr lang="it-IT" dirty="0"/>
           </a:p>
@@ -2201,7 +2201,7 @@
           </a:lstStyle>
           <a:p>
             <a:r>
-              <a:rPr lang="en-US" smtClean="0"/>
+              <a:rPr lang="en-US"/>
               <a:t>Click to edit Master title style</a:t>
             </a:r>
             <a:endParaRPr lang="it-IT"/>
@@ -2328,7 +2328,7 @@
           <a:p>
             <a:pPr lvl="0"/>
             <a:r>
-              <a:rPr lang="en-US" smtClean="0"/>
+              <a:rPr lang="en-US"/>
               <a:t>Click to edit Master text styles</a:t>
             </a:r>
           </a:p>
@@ -2351,7 +2351,7 @@
           <a:p>
             <a:fld id="{9934895A-A1F1-4E43-995C-836991ADE3CE}" type="datetimeFigureOut">
               <a:rPr lang="it-IT" smtClean="0"/>
-              <a:t>05/06/2015</a:t>
+              <a:t>23/08/2016</a:t>
             </a:fld>
             <a:endParaRPr lang="it-IT" dirty="0"/>
           </a:p>
@@ -2460,7 +2460,7 @@
           <a:lstStyle/>
           <a:p>
             <a:r>
-              <a:rPr lang="en-US" smtClean="0"/>
+              <a:rPr lang="en-US"/>
               <a:t>Click to edit Master title style</a:t>
             </a:r>
             <a:endParaRPr lang="it-IT"/>
@@ -2494,35 +2494,35 @@
           <a:p>
             <a:pPr lvl="0"/>
             <a:r>
-              <a:rPr lang="en-US" smtClean="0"/>
+              <a:rPr lang="en-US"/>
               <a:t>Click to edit Master text styles</a:t>
             </a:r>
           </a:p>
           <a:p>
             <a:pPr lvl="1"/>
             <a:r>
-              <a:rPr lang="en-US" smtClean="0"/>
+              <a:rPr lang="en-US"/>
               <a:t>Second level</a:t>
             </a:r>
           </a:p>
           <a:p>
             <a:pPr lvl="2"/>
             <a:r>
-              <a:rPr lang="en-US" smtClean="0"/>
+              <a:rPr lang="en-US"/>
               <a:t>Third level</a:t>
             </a:r>
           </a:p>
           <a:p>
             <a:pPr lvl="3"/>
             <a:r>
-              <a:rPr lang="en-US" smtClean="0"/>
+              <a:rPr lang="en-US"/>
               <a:t>Fourth level</a:t>
             </a:r>
           </a:p>
           <a:p>
             <a:pPr lvl="4"/>
             <a:r>
-              <a:rPr lang="en-US" smtClean="0"/>
+              <a:rPr lang="en-US"/>
               <a:t>Fifth level</a:t>
             </a:r>
             <a:endParaRPr lang="it-IT"/>
@@ -2564,7 +2564,7 @@
           <a:p>
             <a:fld id="{9934895A-A1F1-4E43-995C-836991ADE3CE}" type="datetimeFigureOut">
               <a:rPr lang="it-IT" smtClean="0"/>
-              <a:t>05/06/2015</a:t>
+              <a:t>23/08/2016</a:t>
             </a:fld>
             <a:endParaRPr lang="it-IT" dirty="0"/>
           </a:p>
@@ -3004,7 +3004,7 @@
           <a:p>
             <a:pPr algn="ctr"/>
             <a:r>
-              <a:rPr lang="en-US" sz="1400" dirty="0" smtClean="0"/>
+              <a:rPr lang="en-US" sz="1400" dirty="0"/>
               <a:t>Order Manager</a:t>
             </a:r>
           </a:p>
@@ -3045,10 +3045,10 @@
           <a:p>
             <a:pPr algn="ctr"/>
             <a:r>
-              <a:rPr lang="en-US" sz="1400" dirty="0" smtClean="0"/>
+              <a:rPr lang="en-US" sz="1400" dirty="0"/>
               <a:t>Delivery Manager</a:t>
             </a:r>
-            <a:endParaRPr lang="it-IT" sz="1400" dirty="0" smtClean="0"/>
+            <a:endParaRPr lang="it-IT" sz="1400" dirty="0"/>
           </a:p>
         </p:txBody>
       </p:sp>
@@ -3087,7 +3087,7 @@
           <a:p>
             <a:pPr algn="ctr"/>
             <a:r>
-              <a:rPr lang="en-US" sz="1400" dirty="0" smtClean="0"/>
+              <a:rPr lang="en-US" sz="1400" dirty="0"/>
               <a:t>Shipment Gateway</a:t>
             </a:r>
             <a:endParaRPr lang="it-IT" sz="1400" dirty="0"/>
@@ -3133,7 +3133,7 @@
           <a:p>
             <a:pPr algn="ctr"/>
             <a:r>
-              <a:rPr lang="en-US" sz="1400" dirty="0" smtClean="0"/>
+              <a:rPr lang="en-US" sz="1400" dirty="0"/>
               <a:t>Order Saga</a:t>
             </a:r>
             <a:endParaRPr lang="it-IT" sz="1400" dirty="0"/>
@@ -3179,7 +3179,7 @@
           <a:p>
             <a:pPr algn="ctr"/>
             <a:r>
-              <a:rPr lang="en-US" sz="1400" dirty="0" smtClean="0"/>
+              <a:rPr lang="en-US" sz="1400" dirty="0"/>
               <a:t>Delivery Saga</a:t>
             </a:r>
             <a:endParaRPr lang="it-IT" sz="1400" dirty="0"/>
@@ -3225,7 +3225,7 @@
           <a:p>
             <a:pPr algn="ctr"/>
             <a:r>
-              <a:rPr lang="en-US" sz="1400" dirty="0" smtClean="0"/>
+              <a:rPr lang="en-US" sz="1400" dirty="0"/>
               <a:t>Express Courier Integration</a:t>
             </a:r>
             <a:endParaRPr lang="it-IT" sz="1400" dirty="0"/>
@@ -3442,7 +3442,15 @@
           <a:p>
             <a:r>
               <a:rPr lang="en-US" sz="1100" dirty="0"/>
-              <a:t>Bus.Publish&lt;OrderReady&gt;()</a:t>
+              <a:t>Publish&lt;</a:t>
+            </a:r>
+            <a:r>
+              <a:rPr lang="en-US" sz="1100" dirty="0" err="1"/>
+              <a:t>OrderReady</a:t>
+            </a:r>
+            <a:r>
+              <a:rPr lang="en-US" sz="1100" dirty="0"/>
+              <a:t>&gt;()</a:t>
             </a:r>
             <a:endParaRPr lang="it-IT" sz="1100" dirty="0"/>
           </a:p>
@@ -3479,14 +3487,14 @@
           <a:p>
             <a:pPr algn="ctr"/>
             <a:r>
-              <a:rPr lang="en-US" sz="1100" dirty="0" smtClean="0"/>
+              <a:rPr lang="en-US" sz="1100" dirty="0"/>
               <a:t>Handles OrderReady</a:t>
             </a:r>
           </a:p>
           <a:p>
             <a:pPr algn="ctr"/>
             <a:r>
-              <a:rPr lang="en-US" sz="1100" dirty="0" smtClean="0"/>
+              <a:rPr lang="en-US" sz="1100" dirty="0"/>
               <a:t>Starts DeliverySaga</a:t>
             </a:r>
             <a:endParaRPr lang="it-IT" sz="1100" dirty="0"/>
@@ -3523,8 +3531,16 @@
           </a:lstStyle>
           <a:p>
             <a:r>
-              <a:rPr lang="en-US" sz="1100" dirty="0" smtClean="0"/>
-              <a:t>Bus.Send&lt;ReserveOrderShipment&gt;()</a:t>
+              <a:rPr lang="en-US" sz="1100" dirty="0"/>
+              <a:t>Send&lt;</a:t>
+            </a:r>
+            <a:r>
+              <a:rPr lang="en-US" sz="1100" dirty="0" err="1"/>
+              <a:t>ReserveOrderShipment</a:t>
+            </a:r>
+            <a:r>
+              <a:rPr lang="en-US" sz="1100" dirty="0"/>
+              <a:t>&gt;()</a:t>
             </a:r>
             <a:endParaRPr lang="it-IT" sz="1100" dirty="0"/>
           </a:p>
@@ -3626,7 +3642,7 @@
           <a:lstStyle/>
           <a:p>
             <a:r>
-              <a:rPr lang="en-US" sz="1100" dirty="0" smtClean="0"/>
+              <a:rPr lang="en-US" sz="1100" dirty="0"/>
               <a:t>RequestTimeout&lt;ShipmentReservation&gt;()</a:t>
             </a:r>
             <a:endParaRPr lang="it-IT" sz="1100" dirty="0"/>
@@ -3744,12 +3760,8 @@
           <a:p>
             <a:pPr algn="ctr"/>
             <a:r>
-              <a:rPr lang="en-US" sz="1100" dirty="0" smtClean="0"/>
-              <a:t>ShipmentReservation timeout </a:t>
-            </a:r>
-            <a:r>
-              <a:rPr lang="en-US" sz="1100" dirty="0" smtClean="0"/>
-              <a:t>expired</a:t>
+              <a:rPr lang="en-US" sz="1100" dirty="0"/>
+              <a:t>ShipmentReservation timeout expired</a:t>
             </a:r>
             <a:endParaRPr lang="it-IT" sz="1100" dirty="0"/>
           </a:p>
@@ -3940,11 +3952,7 @@
           <a:p>
             <a:pPr algn="r"/>
             <a:r>
-              <a:rPr lang="en-US" sz="1100" dirty="0" smtClean="0"/>
-              <a:t>Bus.</a:t>
-            </a:r>
-            <a:r>
-              <a:rPr lang="en-US" sz="1100" b="1" dirty="0" smtClean="0">
+              <a:rPr lang="en-US" sz="1100" b="1" dirty="0">
                 <a:solidFill>
                   <a:srgbClr val="FF0000"/>
                 </a:solidFill>
@@ -3952,8 +3960,16 @@
               <a:t>Reply</a:t>
             </a:r>
             <a:r>
-              <a:rPr lang="en-US" sz="1100" dirty="0" smtClean="0"/>
-              <a:t>&lt;ShipmentReserved&gt;()</a:t>
+              <a:rPr lang="en-US" sz="1100" dirty="0"/>
+              <a:t>&lt;</a:t>
+            </a:r>
+            <a:r>
+              <a:rPr lang="en-US" sz="1100" dirty="0" err="1"/>
+              <a:t>ShipmentReserved</a:t>
+            </a:r>
+            <a:r>
+              <a:rPr lang="en-US" sz="1100" dirty="0"/>
+              <a:t>&gt;()</a:t>
             </a:r>
             <a:endParaRPr lang="it-IT" sz="1100" dirty="0"/>
           </a:p>
@@ -4064,7 +4080,7 @@
           <a:p>
             <a:pPr algn="r"/>
             <a:r>
-              <a:rPr lang="en-US" sz="1100" b="1" dirty="0" smtClean="0">
+              <a:rPr lang="en-US" sz="1100" b="1" dirty="0">
                 <a:solidFill>
                   <a:srgbClr val="FF0000"/>
                 </a:solidFill>
@@ -4072,7 +4088,7 @@
               <a:t>ReplyToOriginator</a:t>
             </a:r>
             <a:r>
-              <a:rPr lang="en-US" sz="1100" dirty="0" smtClean="0"/>
+              <a:rPr lang="en-US" sz="1100" dirty="0"/>
               <a:t>&lt;ShipmentStarted&gt;()</a:t>
             </a:r>
             <a:endParaRPr lang="it-IT" sz="1100" dirty="0"/>
@@ -4183,11 +4199,7 @@
           </a:lstStyle>
           <a:p>
             <a:r>
-              <a:rPr lang="en-US" sz="1100" dirty="0" smtClean="0"/>
-              <a:t>Bus.</a:t>
-            </a:r>
-            <a:r>
-              <a:rPr lang="en-US" sz="1100" b="1" dirty="0" smtClean="0">
+              <a:rPr lang="en-US" sz="1100" b="1">
                 <a:solidFill>
                   <a:srgbClr val="FF0000"/>
                 </a:solidFill>
@@ -4195,8 +4207,16 @@
               <a:t>Reply</a:t>
             </a:r>
             <a:r>
+              <a:rPr lang="en-US" sz="1100"/>
+              <a:t>&lt;</a:t>
+            </a:r>
+            <a:r>
+              <a:rPr lang="en-US" sz="1100" dirty="0" err="1"/>
+              <a:t>ShipOrder</a:t>
+            </a:r>
+            <a:r>
               <a:rPr lang="en-US" sz="1100" dirty="0"/>
-              <a:t>&lt;ShipOrder&gt;()</a:t>
+              <a:t>&gt;()</a:t>
             </a:r>
             <a:endParaRPr lang="it-IT" sz="1100" dirty="0"/>
           </a:p>

</xml_diff>